<commit_message>
Added infodesign, fixed some typos
</commit_message>
<xml_diff>
--- a/2016/presentations/info_design.pptx
+++ b/2016/presentations/info_design.pptx
@@ -248,7 +248,7 @@
           <a:p>
             <a:fld id="{FAC72F1A-59F1-0242-A38F-1A193582D9F9}" type="datetimeFigureOut">
               <a:rPr lang="en-US" smtClean="0"/>
-              <a:t>2/9/16</a:t>
+              <a:t>2/16/16</a:t>
             </a:fld>
             <a:endParaRPr lang="en-US"/>
           </a:p>
@@ -2194,11 +2194,7 @@
             </a:pPr>
             <a:r>
               <a:rPr lang="en-US" dirty="0" smtClean="0"/>
-              <a:t>This is a frequently asked question, and the best answer is: Experiment with different charts, to see which works best to liberate the story in your </a:t>
-            </a:r>
-            <a:r>
-              <a:rPr lang="en-US" dirty="0" smtClean="0"/>
-              <a:t>data, thinking about the perceptual hierarchy of visual cues.</a:t>
+              <a:t>This is a frequently asked question, and the best answer is: Experiment with different charts, to see which works best to liberate the story in your data, thinking about the perceptual hierarchy of visual cues.</a:t>
             </a:r>
           </a:p>
           <a:p>
@@ -2213,11 +2209,7 @@
             </a:pPr>
             <a:r>
               <a:rPr lang="en-US" dirty="0" smtClean="0"/>
-              <a:t>Some </a:t>
-            </a:r>
-            <a:r>
-              <a:rPr lang="en-US" dirty="0" smtClean="0"/>
-              <a:t>visualization software — notably </a:t>
+              <a:t>Some visualization software — notably </a:t>
             </a:r>
             <a:r>
               <a:rPr lang="en-US" dirty="0" smtClean="0">
@@ -2227,11 +2219,7 @@
             </a:r>
             <a:r>
               <a:rPr lang="en-US" dirty="0" smtClean="0"/>
-              <a:t> — will suggest chart types for you to try. </a:t>
-            </a:r>
-            <a:r>
-              <a:rPr lang="en-US" dirty="0" smtClean="0"/>
-              <a:t>However, it is good to have a basic framework to help you prioritize particular chart types for particular visualization tasks.</a:t>
+              <a:t> — will suggest chart types for you to try. However, it is good to have a basic framework to help you prioritize particular chart types for particular visualization tasks.</a:t>
             </a:r>
           </a:p>
         </p:txBody>
@@ -10187,15 +10175,7 @@
             </a:pPr>
             <a:r>
               <a:rPr lang="en-US" dirty="0" smtClean="0"/>
-              <a:t>These </a:t>
-            </a:r>
-            <a:r>
-              <a:rPr lang="en-US" dirty="0" smtClean="0"/>
-              <a:t>cues are not created equal, however. </a:t>
-            </a:r>
-            <a:r>
-              <a:rPr lang="en-US" dirty="0" smtClean="0"/>
-              <a:t>In the mid-1980s, statisticians William Cleveland and Robert McGill </a:t>
+              <a:t>These cues are not created equal, however. In the mid-1980s, statisticians William Cleveland and Robert McGill </a:t>
             </a:r>
             <a:r>
               <a:rPr lang="en-US" dirty="0" smtClean="0">
@@ -15630,7 +15610,6 @@
               <a:rPr lang="en-US" noProof="0" smtClean="0"/>
               <a:t>Drag picture to placeholder or click icon to add</a:t>
             </a:r>
-            <a:endParaRPr lang="en-US" noProof="0" smtClean="0"/>
           </a:p>
         </p:txBody>
       </p:sp>
@@ -16066,7 +16045,6 @@
               <a:rPr lang="en-US" smtClean="0"/>
               <a:t>Click to edit Master title style</a:t>
             </a:r>
-            <a:endParaRPr lang="en-US" smtClean="0"/>
           </a:p>
         </p:txBody>
       </p:sp>
@@ -16138,7 +16116,6 @@
               <a:rPr lang="en-US" smtClean="0"/>
               <a:t>Fifth level</a:t>
             </a:r>
-            <a:endParaRPr lang="en-US" smtClean="0"/>
           </a:p>
         </p:txBody>
       </p:sp>
@@ -17517,7 +17494,6 @@
               <a:rPr lang="en-US" sz="2800" b="1" dirty="0" smtClean="0"/>
               <a:t>Slope, note the y axis scale</a:t>
             </a:r>
-            <a:endParaRPr lang="en-US" sz="2800" b="1" dirty="0" smtClean="0"/>
           </a:p>
           <a:p>
             <a:pPr algn="ctr">
@@ -18001,7 +17977,6 @@
               <a:rPr lang="en-US" sz="2800" b="1" dirty="0" smtClean="0"/>
               <a:t>Several counties</a:t>
             </a:r>
-            <a:endParaRPr lang="en-US" sz="2800" b="1" dirty="0" smtClean="0"/>
           </a:p>
         </p:txBody>
       </p:sp>
@@ -18479,7 +18454,6 @@
               <a:rPr lang="en-US" sz="2800" b="1" dirty="0" smtClean="0"/>
               <a:t>All the counties: Too many lines, too few colors</a:t>
             </a:r>
-            <a:endParaRPr lang="en-US" sz="2800" b="1" dirty="0" smtClean="0"/>
           </a:p>
           <a:p>
             <a:pPr algn="ctr">
@@ -18976,7 +18950,6 @@
               <a:rPr lang="en-US" sz="2800" b="1" dirty="0" smtClean="0"/>
               <a:t>olor intensity</a:t>
             </a:r>
-            <a:endParaRPr lang="en-US" sz="2800" b="1" dirty="0" smtClean="0"/>
           </a:p>
           <a:p>
             <a:pPr algn="ctr">
@@ -19468,7 +19441,6 @@
               <a:rPr lang="en-US" sz="2800" b="1" dirty="0" smtClean="0"/>
               <a:t>osition on aligned scale + area</a:t>
             </a:r>
-            <a:endParaRPr lang="en-US" sz="2800" b="1" dirty="0" smtClean="0"/>
           </a:p>
           <a:p>
             <a:pPr algn="ctr">
@@ -19958,7 +19930,6 @@
               <a:rPr lang="en-US" sz="2800" b="1" dirty="0" smtClean="0"/>
               <a:t>Moving up and down the hierarchy</a:t>
             </a:r>
-            <a:endParaRPr lang="en-US" sz="2800" b="1" dirty="0" smtClean="0"/>
           </a:p>
         </p:txBody>
       </p:sp>
@@ -20030,7 +20001,7 @@
   <p:timing>
     <p:tnLst>
       <p:par>
-        <p:cTn xmlns:p14="http://schemas.microsoft.com/office/powerpoint/2010/main" id="1" dur="indefinite" nodeType="tmRoot">
+        <p:cTn xmlns:p14="http://schemas.microsoft.com/office/powerpoint/2010/main" id="1" dur="indefinite" restart="never" nodeType="tmRoot">
           <p:childTnLst>
             <p:seq concurrent="1" nextAc="seek">
               <p:cTn id="2" dur="0" nodeType="mainSeq"/>
@@ -20498,7 +20469,7 @@
   <p:timing>
     <p:tnLst>
       <p:par>
-        <p:cTn xmlns:p14="http://schemas.microsoft.com/office/powerpoint/2010/main" id="1" dur="indefinite" nodeType="tmRoot">
+        <p:cTn xmlns:p14="http://schemas.microsoft.com/office/powerpoint/2010/main" id="1" dur="indefinite" restart="never" nodeType="tmRoot">
           <p:childTnLst>
             <p:seq concurrent="1" nextAc="seek">
               <p:cTn id="2" dur="0" nodeType="mainSeq"/>
@@ -20628,7 +20599,7 @@
   <p:timing>
     <p:tnLst>
       <p:par>
-        <p:cTn xmlns:p14="http://schemas.microsoft.com/office/powerpoint/2010/main" id="1" dur="indefinite" nodeType="tmRoot"/>
+        <p:cTn xmlns:p14="http://schemas.microsoft.com/office/powerpoint/2010/main" id="1" dur="indefinite" restart="never" nodeType="tmRoot"/>
       </p:par>
     </p:tnLst>
   </p:timing>
@@ -20719,36 +20690,6 @@
           <a:chExt cx="0" cy="0"/>
         </a:xfrm>
       </p:grpSpPr>
-      <p:pic>
-        <p:nvPicPr>
-          <p:cNvPr id="3" name="Picture 2" descr="class13_21.jpg"/>
-          <p:cNvPicPr>
-            <a:picLocks noChangeAspect="1"/>
-          </p:cNvPicPr>
-          <p:nvPr/>
-        </p:nvPicPr>
-        <p:blipFill>
-          <a:blip r:embed="rId2">
-            <a:extLst>
-              <a:ext uri="{28A0092B-C50C-407E-A947-70E740481C1C}">
-                <a14:useLocalDpi xmlns:a14="http://schemas.microsoft.com/office/drawing/2010/main" val="0"/>
-              </a:ext>
-            </a:extLst>
-          </a:blip>
-          <a:stretch>
-            <a:fillRect/>
-          </a:stretch>
-        </p:blipFill>
-        <p:spPr>
-          <a:xfrm>
-            <a:off x="0" y="629675"/>
-            <a:ext cx="9144000" cy="6266688"/>
-          </a:xfrm>
-          <a:prstGeom prst="rect">
-            <a:avLst/>
-          </a:prstGeom>
-        </p:spPr>
-      </p:pic>
       <p:sp>
         <p:nvSpPr>
           <p:cNvPr id="4" name="Text Box 1"/>
@@ -21156,10 +21097,39 @@
               <a:rPr lang="en-US" sz="2800" b="1" dirty="0" smtClean="0"/>
               <a:t>Connection</a:t>
             </a:r>
-            <a:endParaRPr lang="en-US" sz="2800" b="1" dirty="0" smtClean="0"/>
           </a:p>
         </p:txBody>
       </p:sp>
+      <p:pic>
+        <p:nvPicPr>
+          <p:cNvPr id="2" name="Picture 1" descr="gephi_28.jpg"/>
+          <p:cNvPicPr>
+            <a:picLocks noChangeAspect="1"/>
+          </p:cNvPicPr>
+          <p:nvPr/>
+        </p:nvPicPr>
+        <p:blipFill>
+          <a:blip r:embed="rId2">
+            <a:extLst>
+              <a:ext uri="{28A0092B-C50C-407E-A947-70E740481C1C}">
+                <a14:useLocalDpi xmlns:a14="http://schemas.microsoft.com/office/drawing/2010/main" val="0"/>
+              </a:ext>
+            </a:extLst>
+          </a:blip>
+          <a:stretch>
+            <a:fillRect/>
+          </a:stretch>
+        </p:blipFill>
+        <p:spPr>
+          <a:xfrm>
+            <a:off x="1272243" y="914400"/>
+            <a:ext cx="6599515" cy="5943600"/>
+          </a:xfrm>
+          <a:prstGeom prst="rect">
+            <a:avLst/>
+          </a:prstGeom>
+        </p:spPr>
+      </p:pic>
     </p:spTree>
     <p:extLst>
       <p:ext uri="{BB962C8B-B14F-4D97-AF65-F5344CB8AC3E}">
@@ -21673,7 +21643,7 @@
   <p:timing>
     <p:tnLst>
       <p:par>
-        <p:cTn xmlns:p14="http://schemas.microsoft.com/office/powerpoint/2010/main" id="1" dur="indefinite" nodeType="tmRoot">
+        <p:cTn xmlns:p14="http://schemas.microsoft.com/office/powerpoint/2010/main" id="1" dur="indefinite" restart="never" nodeType="tmRoot">
           <p:childTnLst>
             <p:seq concurrent="1" nextAc="seek">
               <p:cTn id="2" dur="0" nodeType="mainSeq"/>
@@ -22696,7 +22666,7 @@
   <p:timing>
     <p:tnLst>
       <p:par>
-        <p:cTn xmlns:p14="http://schemas.microsoft.com/office/powerpoint/2010/main" id="1" dur="indefinite" nodeType="tmRoot">
+        <p:cTn xmlns:p14="http://schemas.microsoft.com/office/powerpoint/2010/main" id="1" dur="indefinite" restart="never" nodeType="tmRoot">
           <p:childTnLst>
             <p:seq concurrent="1" nextAc="seek">
               <p:cTn id="2" dur="0" nodeType="mainSeq"/>
@@ -23218,7 +23188,7 @@
   <p:timing>
     <p:tnLst>
       <p:par>
-        <p:cTn xmlns:p14="http://schemas.microsoft.com/office/powerpoint/2010/main" id="1" dur="indefinite" nodeType="tmRoot">
+        <p:cTn xmlns:p14="http://schemas.microsoft.com/office/powerpoint/2010/main" id="1" dur="indefinite" restart="never" nodeType="tmRoot">
           <p:childTnLst>
             <p:seq concurrent="1" nextAc="seek">
               <p:cTn id="2" dur="0" nodeType="mainSeq"/>
@@ -23740,7 +23710,7 @@
   <p:timing>
     <p:tnLst>
       <p:par>
-        <p:cTn xmlns:p14="http://schemas.microsoft.com/office/powerpoint/2010/main" id="1" dur="indefinite" nodeType="tmRoot">
+        <p:cTn xmlns:p14="http://schemas.microsoft.com/office/powerpoint/2010/main" id="1" dur="indefinite" restart="never" nodeType="tmRoot">
           <p:childTnLst>
             <p:seq concurrent="1" nextAc="seek">
               <p:cTn id="2" dur="0" nodeType="mainSeq"/>
@@ -24290,7 +24260,7 @@
   <p:timing>
     <p:tnLst>
       <p:par>
-        <p:cTn xmlns:p14="http://schemas.microsoft.com/office/powerpoint/2010/main" id="1" dur="indefinite" nodeType="tmRoot">
+        <p:cTn xmlns:p14="http://schemas.microsoft.com/office/powerpoint/2010/main" id="1" dur="indefinite" restart="never" nodeType="tmRoot">
           <p:childTnLst>
             <p:seq concurrent="1" nextAc="seek">
               <p:cTn id="2" dur="0" nodeType="mainSeq"/>
@@ -24819,7 +24789,7 @@
   <p:timing>
     <p:tnLst>
       <p:par>
-        <p:cTn xmlns:p14="http://schemas.microsoft.com/office/powerpoint/2010/main" id="1" dur="indefinite" nodeType="tmRoot"/>
+        <p:cTn xmlns:p14="http://schemas.microsoft.com/office/powerpoint/2010/main" id="1" dur="indefinite" restart="never" nodeType="tmRoot"/>
       </p:par>
     </p:tnLst>
   </p:timing>
@@ -26092,7 +26062,7 @@
   <p:timing>
     <p:tnLst>
       <p:par>
-        <p:cTn xmlns:p14="http://schemas.microsoft.com/office/powerpoint/2010/main" id="1" dur="indefinite" nodeType="tmRoot">
+        <p:cTn xmlns:p14="http://schemas.microsoft.com/office/powerpoint/2010/main" id="1" dur="indefinite" restart="never" nodeType="tmRoot">
           <p:childTnLst>
             <p:seq concurrent="1" nextAc="seek">
               <p:cTn id="2" dur="0" nodeType="mainSeq"/>
@@ -26614,7 +26584,7 @@
   <p:timing>
     <p:tnLst>
       <p:par>
-        <p:cTn xmlns:p14="http://schemas.microsoft.com/office/powerpoint/2010/main" id="1" dur="indefinite" nodeType="tmRoot">
+        <p:cTn xmlns:p14="http://schemas.microsoft.com/office/powerpoint/2010/main" id="1" dur="indefinite" restart="never" nodeType="tmRoot">
           <p:childTnLst>
             <p:seq concurrent="1" nextAc="seek">
               <p:cTn id="2" dur="0" nodeType="mainSeq"/>
@@ -27074,7 +27044,6 @@
               <a:rPr lang="en-US" sz="2800" b="1" dirty="0" smtClean="0"/>
               <a:t>everything is a bar chart</a:t>
             </a:r>
-            <a:endParaRPr lang="en-US" sz="2800" b="1" dirty="0" smtClean="0"/>
           </a:p>
         </p:txBody>
       </p:sp>
@@ -27092,7 +27061,7 @@
   <p:timing>
     <p:tnLst>
       <p:par>
-        <p:cTn xmlns:p14="http://schemas.microsoft.com/office/powerpoint/2010/main" id="1" dur="indefinite" nodeType="tmRoot">
+        <p:cTn xmlns:p14="http://schemas.microsoft.com/office/powerpoint/2010/main" id="1" dur="indefinite" restart="never" nodeType="tmRoot">
           <p:childTnLst>
             <p:seq concurrent="1" nextAc="seek">
               <p:cTn id="2" dur="0" nodeType="mainSeq"/>
@@ -28051,7 +28020,6 @@
               <a:rPr lang="en-US" sz="2800" b="1" dirty="0" smtClean="0"/>
               <a:t>California kindergartens</a:t>
             </a:r>
-            <a:endParaRPr lang="en-US" sz="2800" b="1" dirty="0" smtClean="0"/>
           </a:p>
         </p:txBody>
       </p:sp>
@@ -28069,7 +28037,7 @@
   <p:timing>
     <p:tnLst>
       <p:par>
-        <p:cTn xmlns:p14="http://schemas.microsoft.com/office/powerpoint/2010/main" id="1" dur="indefinite" nodeType="tmRoot">
+        <p:cTn xmlns:p14="http://schemas.microsoft.com/office/powerpoint/2010/main" id="1" dur="indefinite" restart="never" nodeType="tmRoot">
           <p:childTnLst>
             <p:seq concurrent="1" nextAc="seek">
               <p:cTn id="2" dur="0" nodeType="mainSeq"/>
@@ -28550,7 +28518,6 @@
               <a:rPr lang="en-US" sz="2800" b="1" dirty="0" smtClean="0"/>
               <a:t>Length on aligned scale</a:t>
             </a:r>
-            <a:endParaRPr lang="en-US" sz="2800" b="1" dirty="0" smtClean="0"/>
           </a:p>
           <a:p>
             <a:pPr algn="ctr">
@@ -29034,7 +29001,6 @@
               <a:rPr lang="en-US" sz="2800" b="1" dirty="0" smtClean="0"/>
               <a:t>Position on aligned scale + slope</a:t>
             </a:r>
-            <a:endParaRPr lang="en-US" sz="2800" b="1" dirty="0" smtClean="0"/>
           </a:p>
           <a:p>
             <a:pPr algn="ctr">

</xml_diff>